<commit_message>
The proposed model is separated form implementaton
</commit_message>
<xml_diff>
--- a/NewThesis/LaTex-template-package/LaTex-template-package/Drawing4/FinalCorr.pptx
+++ b/NewThesis/LaTex-template-package/LaTex-template-package/Drawing4/FinalCorr.pptx
@@ -243,7 +243,7 @@
           <a:p>
             <a:fld id="{18A28253-4B93-4F10-A248-DA5D859E28EF}" type="datetimeFigureOut">
               <a:rPr lang="en-US" smtClean="0"/>
-              <a:t>7/29/2016</a:t>
+              <a:t>8/8/2016</a:t>
             </a:fld>
             <a:endParaRPr lang="en-US"/>
           </a:p>
@@ -413,7 +413,7 @@
           <a:p>
             <a:fld id="{18A28253-4B93-4F10-A248-DA5D859E28EF}" type="datetimeFigureOut">
               <a:rPr lang="en-US" smtClean="0"/>
-              <a:t>7/29/2016</a:t>
+              <a:t>8/8/2016</a:t>
             </a:fld>
             <a:endParaRPr lang="en-US"/>
           </a:p>
@@ -593,7 +593,7 @@
           <a:p>
             <a:fld id="{18A28253-4B93-4F10-A248-DA5D859E28EF}" type="datetimeFigureOut">
               <a:rPr lang="en-US" smtClean="0"/>
-              <a:t>7/29/2016</a:t>
+              <a:t>8/8/2016</a:t>
             </a:fld>
             <a:endParaRPr lang="en-US"/>
           </a:p>
@@ -763,7 +763,7 @@
           <a:p>
             <a:fld id="{18A28253-4B93-4F10-A248-DA5D859E28EF}" type="datetimeFigureOut">
               <a:rPr lang="en-US" smtClean="0"/>
-              <a:t>7/29/2016</a:t>
+              <a:t>8/8/2016</a:t>
             </a:fld>
             <a:endParaRPr lang="en-US"/>
           </a:p>
@@ -1009,7 +1009,7 @@
           <a:p>
             <a:fld id="{18A28253-4B93-4F10-A248-DA5D859E28EF}" type="datetimeFigureOut">
               <a:rPr lang="en-US" smtClean="0"/>
-              <a:t>7/29/2016</a:t>
+              <a:t>8/8/2016</a:t>
             </a:fld>
             <a:endParaRPr lang="en-US"/>
           </a:p>
@@ -1241,7 +1241,7 @@
           <a:p>
             <a:fld id="{18A28253-4B93-4F10-A248-DA5D859E28EF}" type="datetimeFigureOut">
               <a:rPr lang="en-US" smtClean="0"/>
-              <a:t>7/29/2016</a:t>
+              <a:t>8/8/2016</a:t>
             </a:fld>
             <a:endParaRPr lang="en-US"/>
           </a:p>
@@ -1608,7 +1608,7 @@
           <a:p>
             <a:fld id="{18A28253-4B93-4F10-A248-DA5D859E28EF}" type="datetimeFigureOut">
               <a:rPr lang="en-US" smtClean="0"/>
-              <a:t>7/29/2016</a:t>
+              <a:t>8/8/2016</a:t>
             </a:fld>
             <a:endParaRPr lang="en-US"/>
           </a:p>
@@ -1726,7 +1726,7 @@
           <a:p>
             <a:fld id="{18A28253-4B93-4F10-A248-DA5D859E28EF}" type="datetimeFigureOut">
               <a:rPr lang="en-US" smtClean="0"/>
-              <a:t>7/29/2016</a:t>
+              <a:t>8/8/2016</a:t>
             </a:fld>
             <a:endParaRPr lang="en-US"/>
           </a:p>
@@ -1821,7 +1821,7 @@
           <a:p>
             <a:fld id="{18A28253-4B93-4F10-A248-DA5D859E28EF}" type="datetimeFigureOut">
               <a:rPr lang="en-US" smtClean="0"/>
-              <a:t>7/29/2016</a:t>
+              <a:t>8/8/2016</a:t>
             </a:fld>
             <a:endParaRPr lang="en-US"/>
           </a:p>
@@ -2098,7 +2098,7 @@
           <a:p>
             <a:fld id="{18A28253-4B93-4F10-A248-DA5D859E28EF}" type="datetimeFigureOut">
               <a:rPr lang="en-US" smtClean="0"/>
-              <a:t>7/29/2016</a:t>
+              <a:t>8/8/2016</a:t>
             </a:fld>
             <a:endParaRPr lang="en-US"/>
           </a:p>
@@ -2355,7 +2355,7 @@
           <a:p>
             <a:fld id="{18A28253-4B93-4F10-A248-DA5D859E28EF}" type="datetimeFigureOut">
               <a:rPr lang="en-US" smtClean="0"/>
-              <a:t>7/29/2016</a:t>
+              <a:t>8/8/2016</a:t>
             </a:fld>
             <a:endParaRPr lang="en-US"/>
           </a:p>
@@ -2568,7 +2568,7 @@
           <a:p>
             <a:fld id="{18A28253-4B93-4F10-A248-DA5D859E28EF}" type="datetimeFigureOut">
               <a:rPr lang="en-US" smtClean="0"/>
-              <a:t>7/29/2016</a:t>
+              <a:t>8/8/2016</a:t>
             </a:fld>
             <a:endParaRPr lang="en-US"/>
           </a:p>
@@ -5007,44 +5007,6 @@
           </a:fontRef>
         </p:style>
       </p:cxnSp>
-      <p:sp>
-        <p:nvSpPr>
-          <p:cNvPr id="18" name="TextBox 17"/>
-          <p:cNvSpPr txBox="1"/>
-          <p:nvPr/>
-        </p:nvSpPr>
-        <p:spPr>
-          <a:xfrm>
-            <a:off x="7477849" y="4778896"/>
-            <a:ext cx="625151" cy="338554"/>
-          </a:xfrm>
-          <a:prstGeom prst="rect">
-            <a:avLst/>
-          </a:prstGeom>
-          <a:noFill/>
-          <a:ln>
-            <a:noFill/>
-          </a:ln>
-        </p:spPr>
-        <p:txBody>
-          <a:bodyPr wrap="square" rtlCol="0">
-            <a:spAutoFit/>
-          </a:bodyPr>
-          <a:lstStyle/>
-          <a:p>
-            <a:r>
-              <a:rPr lang="en-CA" sz="1600" dirty="0">
-                <a:solidFill>
-                  <a:schemeClr val="bg2">
-                    <a:lumMod val="50000"/>
-                  </a:schemeClr>
-                </a:solidFill>
-              </a:rPr>
-              <a:t>0.75</a:t>
-            </a:r>
-          </a:p>
-        </p:txBody>
-      </p:sp>
       <p:cxnSp>
         <p:nvCxnSpPr>
           <p:cNvPr id="42" name="Straight Arrow Connector 41"/>

</xml_diff>